<commit_message>
Chap01: Good CdTe band
</commit_message>
<xml_diff>
--- a/05-CrDyn/Pictures/ContProbe.pptx
+++ b/05-CrDyn/Pictures/ContProbe.pptx
@@ -288,7 +288,7 @@
           <a:p>
             <a:fld id="{08B3D2A7-D861-4126-922F-0D373D3F308C}" type="datetimeFigureOut">
               <a:rPr lang="fr-FR" smtClean="0"/>
-              <a:t>29/06/2017</a:t>
+              <a:t>19/10/2017</a:t>
             </a:fld>
             <a:endParaRPr lang="fr-FR"/>
           </a:p>
@@ -458,7 +458,7 @@
           <a:p>
             <a:fld id="{08B3D2A7-D861-4126-922F-0D373D3F308C}" type="datetimeFigureOut">
               <a:rPr lang="fr-FR" smtClean="0"/>
-              <a:t>29/06/2017</a:t>
+              <a:t>19/10/2017</a:t>
             </a:fld>
             <a:endParaRPr lang="fr-FR"/>
           </a:p>
@@ -638,7 +638,7 @@
           <a:p>
             <a:fld id="{08B3D2A7-D861-4126-922F-0D373D3F308C}" type="datetimeFigureOut">
               <a:rPr lang="fr-FR" smtClean="0"/>
-              <a:t>29/06/2017</a:t>
+              <a:t>19/10/2017</a:t>
             </a:fld>
             <a:endParaRPr lang="fr-FR"/>
           </a:p>
@@ -808,7 +808,7 @@
           <a:p>
             <a:fld id="{08B3D2A7-D861-4126-922F-0D373D3F308C}" type="datetimeFigureOut">
               <a:rPr lang="fr-FR" smtClean="0"/>
-              <a:t>29/06/2017</a:t>
+              <a:t>19/10/2017</a:t>
             </a:fld>
             <a:endParaRPr lang="fr-FR"/>
           </a:p>
@@ -1054,7 +1054,7 @@
           <a:p>
             <a:fld id="{08B3D2A7-D861-4126-922F-0D373D3F308C}" type="datetimeFigureOut">
               <a:rPr lang="fr-FR" smtClean="0"/>
-              <a:t>29/06/2017</a:t>
+              <a:t>19/10/2017</a:t>
             </a:fld>
             <a:endParaRPr lang="fr-FR"/>
           </a:p>
@@ -1342,7 +1342,7 @@
           <a:p>
             <a:fld id="{08B3D2A7-D861-4126-922F-0D373D3F308C}" type="datetimeFigureOut">
               <a:rPr lang="fr-FR" smtClean="0"/>
-              <a:t>29/06/2017</a:t>
+              <a:t>19/10/2017</a:t>
             </a:fld>
             <a:endParaRPr lang="fr-FR"/>
           </a:p>
@@ -1764,7 +1764,7 @@
           <a:p>
             <a:fld id="{08B3D2A7-D861-4126-922F-0D373D3F308C}" type="datetimeFigureOut">
               <a:rPr lang="fr-FR" smtClean="0"/>
-              <a:t>29/06/2017</a:t>
+              <a:t>19/10/2017</a:t>
             </a:fld>
             <a:endParaRPr lang="fr-FR"/>
           </a:p>
@@ -1882,7 +1882,7 @@
           <a:p>
             <a:fld id="{08B3D2A7-D861-4126-922F-0D373D3F308C}" type="datetimeFigureOut">
               <a:rPr lang="fr-FR" smtClean="0"/>
-              <a:t>29/06/2017</a:t>
+              <a:t>19/10/2017</a:t>
             </a:fld>
             <a:endParaRPr lang="fr-FR"/>
           </a:p>
@@ -1977,7 +1977,7 @@
           <a:p>
             <a:fld id="{08B3D2A7-D861-4126-922F-0D373D3F308C}" type="datetimeFigureOut">
               <a:rPr lang="fr-FR" smtClean="0"/>
-              <a:t>29/06/2017</a:t>
+              <a:t>19/10/2017</a:t>
             </a:fld>
             <a:endParaRPr lang="fr-FR"/>
           </a:p>
@@ -2254,7 +2254,7 @@
           <a:p>
             <a:fld id="{08B3D2A7-D861-4126-922F-0D373D3F308C}" type="datetimeFigureOut">
               <a:rPr lang="fr-FR" smtClean="0"/>
-              <a:t>29/06/2017</a:t>
+              <a:t>19/10/2017</a:t>
             </a:fld>
             <a:endParaRPr lang="fr-FR"/>
           </a:p>
@@ -2507,7 +2507,7 @@
           <a:p>
             <a:fld id="{08B3D2A7-D861-4126-922F-0D373D3F308C}" type="datetimeFigureOut">
               <a:rPr lang="fr-FR" smtClean="0"/>
-              <a:t>29/06/2017</a:t>
+              <a:t>19/10/2017</a:t>
             </a:fld>
             <a:endParaRPr lang="fr-FR"/>
           </a:p>
@@ -2720,7 +2720,7 @@
           <a:p>
             <a:fld id="{08B3D2A7-D861-4126-922F-0D373D3F308C}" type="datetimeFigureOut">
               <a:rPr lang="fr-FR" smtClean="0"/>
-              <a:t>29/06/2017</a:t>
+              <a:t>19/10/2017</a:t>
             </a:fld>
             <a:endParaRPr lang="fr-FR"/>
           </a:p>
@@ -3097,7 +3097,7 @@
       </p:grpSpPr>
       <p:pic>
         <p:nvPicPr>
-          <p:cNvPr id="28" name="Picture 2"/>
+          <p:cNvPr id="1026" name="Picture 2"/>
           <p:cNvPicPr>
             <a:picLocks noChangeAspect="1" noChangeArrowheads="1"/>
           </p:cNvPicPr>
@@ -3118,8 +3118,8 @@
         </p:blipFill>
         <p:spPr bwMode="auto">
           <a:xfrm>
-            <a:off x="-36512" y="-98513"/>
-            <a:ext cx="5164137" cy="5768975"/>
+            <a:off x="-36000" y="-97200"/>
+            <a:ext cx="5216525" cy="5768975"/>
           </a:xfrm>
           <a:prstGeom prst="rect">
             <a:avLst/>
@@ -3151,7 +3151,7 @@
       </p:pic>
       <p:pic>
         <p:nvPicPr>
-          <p:cNvPr id="29" name="Picture 3"/>
+          <p:cNvPr id="1027" name="Picture 3"/>
           <p:cNvPicPr>
             <a:picLocks noChangeAspect="1" noChangeArrowheads="1"/>
           </p:cNvPicPr>
@@ -3172,8 +3172,8 @@
         </p:blipFill>
         <p:spPr bwMode="auto">
           <a:xfrm>
-            <a:off x="4788024" y="-99392"/>
-            <a:ext cx="5164137" cy="5768975"/>
+            <a:off x="4788000" y="-97200"/>
+            <a:ext cx="5216525" cy="5768976"/>
           </a:xfrm>
           <a:prstGeom prst="rect">
             <a:avLst/>
@@ -3212,7 +3212,7 @@
         <p:spPr>
           <a:xfrm>
             <a:off x="85454" y="-99392"/>
-            <a:ext cx="526106" cy="461665"/>
+            <a:ext cx="583814" cy="523220"/>
           </a:xfrm>
           <a:prstGeom prst="rect">
             <a:avLst/>
@@ -3226,13 +3226,13 @@
           <a:lstStyle/>
           <a:p>
             <a:r>
-              <a:rPr lang="fr-FR" sz="2400" dirty="0" smtClean="0">
+              <a:rPr lang="fr-FR" sz="2800" dirty="0" smtClean="0">
                 <a:latin typeface="Times New Roman" panose="02020603050405020304" pitchFamily="18" charset="0"/>
                 <a:cs typeface="Times New Roman" panose="02020603050405020304" pitchFamily="18" charset="0"/>
               </a:rPr>
               <a:t>(a)</a:t>
             </a:r>
-            <a:endParaRPr lang="fr-FR" sz="2400" dirty="0">
+            <a:endParaRPr lang="fr-FR" sz="2800" dirty="0">
               <a:latin typeface="Times New Roman" panose="02020603050405020304" pitchFamily="18" charset="0"/>
               <a:cs typeface="Times New Roman" panose="02020603050405020304" pitchFamily="18" charset="0"/>
             </a:endParaRPr>
@@ -3248,7 +3248,7 @@
         <p:spPr>
           <a:xfrm>
             <a:off x="4909990" y="-99392"/>
-            <a:ext cx="543739" cy="461665"/>
+            <a:ext cx="604653" cy="523220"/>
           </a:xfrm>
           <a:prstGeom prst="rect">
             <a:avLst/>
@@ -3262,13 +3262,13 @@
           <a:lstStyle/>
           <a:p>
             <a:r>
-              <a:rPr lang="fr-FR" sz="2400" dirty="0" smtClean="0">
+              <a:rPr lang="fr-FR" sz="2800" dirty="0" smtClean="0">
                 <a:latin typeface="Times New Roman" panose="02020603050405020304" pitchFamily="18" charset="0"/>
                 <a:cs typeface="Times New Roman" panose="02020603050405020304" pitchFamily="18" charset="0"/>
               </a:rPr>
               <a:t>(b)</a:t>
             </a:r>
-            <a:endParaRPr lang="fr-FR" sz="2400" dirty="0">
+            <a:endParaRPr lang="fr-FR" sz="2800" dirty="0">
               <a:latin typeface="Times New Roman" panose="02020603050405020304" pitchFamily="18" charset="0"/>
               <a:cs typeface="Times New Roman" panose="02020603050405020304" pitchFamily="18" charset="0"/>
             </a:endParaRPr>

</xml_diff>

<commit_message>
Chap05: Correction hervé done
</commit_message>
<xml_diff>
--- a/05-CrDyn/Pictures/ContProbe.pptx
+++ b/05-CrDyn/Pictures/ContProbe.pptx
@@ -288,7 +288,7 @@
           <a:p>
             <a:fld id="{08B3D2A7-D861-4126-922F-0D373D3F308C}" type="datetimeFigureOut">
               <a:rPr lang="fr-FR" smtClean="0"/>
-              <a:t>19/10/2017</a:t>
+              <a:t>07/11/2017</a:t>
             </a:fld>
             <a:endParaRPr lang="fr-FR"/>
           </a:p>
@@ -458,7 +458,7 @@
           <a:p>
             <a:fld id="{08B3D2A7-D861-4126-922F-0D373D3F308C}" type="datetimeFigureOut">
               <a:rPr lang="fr-FR" smtClean="0"/>
-              <a:t>19/10/2017</a:t>
+              <a:t>07/11/2017</a:t>
             </a:fld>
             <a:endParaRPr lang="fr-FR"/>
           </a:p>
@@ -638,7 +638,7 @@
           <a:p>
             <a:fld id="{08B3D2A7-D861-4126-922F-0D373D3F308C}" type="datetimeFigureOut">
               <a:rPr lang="fr-FR" smtClean="0"/>
-              <a:t>19/10/2017</a:t>
+              <a:t>07/11/2017</a:t>
             </a:fld>
             <a:endParaRPr lang="fr-FR"/>
           </a:p>
@@ -808,7 +808,7 @@
           <a:p>
             <a:fld id="{08B3D2A7-D861-4126-922F-0D373D3F308C}" type="datetimeFigureOut">
               <a:rPr lang="fr-FR" smtClean="0"/>
-              <a:t>19/10/2017</a:t>
+              <a:t>07/11/2017</a:t>
             </a:fld>
             <a:endParaRPr lang="fr-FR"/>
           </a:p>
@@ -1054,7 +1054,7 @@
           <a:p>
             <a:fld id="{08B3D2A7-D861-4126-922F-0D373D3F308C}" type="datetimeFigureOut">
               <a:rPr lang="fr-FR" smtClean="0"/>
-              <a:t>19/10/2017</a:t>
+              <a:t>07/11/2017</a:t>
             </a:fld>
             <a:endParaRPr lang="fr-FR"/>
           </a:p>
@@ -1342,7 +1342,7 @@
           <a:p>
             <a:fld id="{08B3D2A7-D861-4126-922F-0D373D3F308C}" type="datetimeFigureOut">
               <a:rPr lang="fr-FR" smtClean="0"/>
-              <a:t>19/10/2017</a:t>
+              <a:t>07/11/2017</a:t>
             </a:fld>
             <a:endParaRPr lang="fr-FR"/>
           </a:p>
@@ -1764,7 +1764,7 @@
           <a:p>
             <a:fld id="{08B3D2A7-D861-4126-922F-0D373D3F308C}" type="datetimeFigureOut">
               <a:rPr lang="fr-FR" smtClean="0"/>
-              <a:t>19/10/2017</a:t>
+              <a:t>07/11/2017</a:t>
             </a:fld>
             <a:endParaRPr lang="fr-FR"/>
           </a:p>
@@ -1882,7 +1882,7 @@
           <a:p>
             <a:fld id="{08B3D2A7-D861-4126-922F-0D373D3F308C}" type="datetimeFigureOut">
               <a:rPr lang="fr-FR" smtClean="0"/>
-              <a:t>19/10/2017</a:t>
+              <a:t>07/11/2017</a:t>
             </a:fld>
             <a:endParaRPr lang="fr-FR"/>
           </a:p>
@@ -1977,7 +1977,7 @@
           <a:p>
             <a:fld id="{08B3D2A7-D861-4126-922F-0D373D3F308C}" type="datetimeFigureOut">
               <a:rPr lang="fr-FR" smtClean="0"/>
-              <a:t>19/10/2017</a:t>
+              <a:t>07/11/2017</a:t>
             </a:fld>
             <a:endParaRPr lang="fr-FR"/>
           </a:p>
@@ -2254,7 +2254,7 @@
           <a:p>
             <a:fld id="{08B3D2A7-D861-4126-922F-0D373D3F308C}" type="datetimeFigureOut">
               <a:rPr lang="fr-FR" smtClean="0"/>
-              <a:t>19/10/2017</a:t>
+              <a:t>07/11/2017</a:t>
             </a:fld>
             <a:endParaRPr lang="fr-FR"/>
           </a:p>
@@ -2507,7 +2507,7 @@
           <a:p>
             <a:fld id="{08B3D2A7-D861-4126-922F-0D373D3F308C}" type="datetimeFigureOut">
               <a:rPr lang="fr-FR" smtClean="0"/>
-              <a:t>19/10/2017</a:t>
+              <a:t>07/11/2017</a:t>
             </a:fld>
             <a:endParaRPr lang="fr-FR"/>
           </a:p>
@@ -2720,7 +2720,7 @@
           <a:p>
             <a:fld id="{08B3D2A7-D861-4126-922F-0D373D3F308C}" type="datetimeFigureOut">
               <a:rPr lang="fr-FR" smtClean="0"/>
-              <a:t>19/10/2017</a:t>
+              <a:t>07/11/2017</a:t>
             </a:fld>
             <a:endParaRPr lang="fr-FR"/>
           </a:p>
@@ -3275,6 +3275,472 @@
           </a:p>
         </p:txBody>
       </p:sp>
+      <p:cxnSp>
+        <p:nvCxnSpPr>
+          <p:cNvPr id="3" name="Connecteur droit 2"/>
+          <p:cNvCxnSpPr/>
+          <p:nvPr/>
+        </p:nvCxnSpPr>
+        <p:spPr>
+          <a:xfrm>
+            <a:off x="1146274" y="4158183"/>
+            <a:ext cx="0" cy="288032"/>
+          </a:xfrm>
+          <a:prstGeom prst="line">
+            <a:avLst/>
+          </a:prstGeom>
+          <a:ln w="19050">
+            <a:solidFill>
+              <a:schemeClr val="tx1"/>
+            </a:solidFill>
+          </a:ln>
+        </p:spPr>
+        <p:style>
+          <a:lnRef idx="1">
+            <a:schemeClr val="accent1"/>
+          </a:lnRef>
+          <a:fillRef idx="0">
+            <a:schemeClr val="accent1"/>
+          </a:fillRef>
+          <a:effectRef idx="0">
+            <a:schemeClr val="accent1"/>
+          </a:effectRef>
+          <a:fontRef idx="minor">
+            <a:schemeClr val="tx1"/>
+          </a:fontRef>
+        </p:style>
+      </p:cxnSp>
+      <p:cxnSp>
+        <p:nvCxnSpPr>
+          <p:cNvPr id="8" name="Connecteur droit 7"/>
+          <p:cNvCxnSpPr/>
+          <p:nvPr/>
+        </p:nvCxnSpPr>
+        <p:spPr>
+          <a:xfrm>
+            <a:off x="2557751" y="4158183"/>
+            <a:ext cx="0" cy="288032"/>
+          </a:xfrm>
+          <a:prstGeom prst="line">
+            <a:avLst/>
+          </a:prstGeom>
+          <a:ln w="19050">
+            <a:solidFill>
+              <a:schemeClr val="tx1"/>
+            </a:solidFill>
+          </a:ln>
+        </p:spPr>
+        <p:style>
+          <a:lnRef idx="1">
+            <a:schemeClr val="accent1"/>
+          </a:lnRef>
+          <a:fillRef idx="0">
+            <a:schemeClr val="accent1"/>
+          </a:fillRef>
+          <a:effectRef idx="0">
+            <a:schemeClr val="accent1"/>
+          </a:effectRef>
+          <a:fontRef idx="minor">
+            <a:schemeClr val="tx1"/>
+          </a:fontRef>
+        </p:style>
+      </p:cxnSp>
+      <p:cxnSp>
+        <p:nvCxnSpPr>
+          <p:cNvPr id="5" name="Connecteur droit 4"/>
+          <p:cNvCxnSpPr/>
+          <p:nvPr/>
+        </p:nvCxnSpPr>
+        <p:spPr>
+          <a:xfrm>
+            <a:off x="954013" y="4446215"/>
+            <a:ext cx="192261" cy="0"/>
+          </a:xfrm>
+          <a:prstGeom prst="line">
+            <a:avLst/>
+          </a:prstGeom>
+          <a:ln w="19050">
+            <a:solidFill>
+              <a:schemeClr val="tx1"/>
+            </a:solidFill>
+          </a:ln>
+        </p:spPr>
+        <p:style>
+          <a:lnRef idx="1">
+            <a:schemeClr val="accent1"/>
+          </a:lnRef>
+          <a:fillRef idx="0">
+            <a:schemeClr val="accent1"/>
+          </a:fillRef>
+          <a:effectRef idx="0">
+            <a:schemeClr val="accent1"/>
+          </a:effectRef>
+          <a:fontRef idx="minor">
+            <a:schemeClr val="tx1"/>
+          </a:fontRef>
+        </p:style>
+      </p:cxnSp>
+      <p:cxnSp>
+        <p:nvCxnSpPr>
+          <p:cNvPr id="11" name="Connecteur droit 10"/>
+          <p:cNvCxnSpPr/>
+          <p:nvPr/>
+        </p:nvCxnSpPr>
+        <p:spPr>
+          <a:xfrm>
+            <a:off x="2561952" y="4446215"/>
+            <a:ext cx="2064469" cy="0"/>
+          </a:xfrm>
+          <a:prstGeom prst="line">
+            <a:avLst/>
+          </a:prstGeom>
+          <a:ln w="19050">
+            <a:solidFill>
+              <a:schemeClr val="tx1"/>
+            </a:solidFill>
+          </a:ln>
+        </p:spPr>
+        <p:style>
+          <a:lnRef idx="1">
+            <a:schemeClr val="accent1"/>
+          </a:lnRef>
+          <a:fillRef idx="0">
+            <a:schemeClr val="accent1"/>
+          </a:fillRef>
+          <a:effectRef idx="0">
+            <a:schemeClr val="accent1"/>
+          </a:effectRef>
+          <a:fontRef idx="minor">
+            <a:schemeClr val="tx1"/>
+          </a:fontRef>
+        </p:style>
+      </p:cxnSp>
+      <p:cxnSp>
+        <p:nvCxnSpPr>
+          <p:cNvPr id="13" name="Connecteur droit 12"/>
+          <p:cNvCxnSpPr/>
+          <p:nvPr/>
+        </p:nvCxnSpPr>
+        <p:spPr>
+          <a:xfrm>
+            <a:off x="1146274" y="4158183"/>
+            <a:ext cx="1411477" cy="0"/>
+          </a:xfrm>
+          <a:prstGeom prst="line">
+            <a:avLst/>
+          </a:prstGeom>
+          <a:ln w="19050">
+            <a:solidFill>
+              <a:schemeClr val="tx1"/>
+            </a:solidFill>
+          </a:ln>
+        </p:spPr>
+        <p:style>
+          <a:lnRef idx="1">
+            <a:schemeClr val="accent1"/>
+          </a:lnRef>
+          <a:fillRef idx="0">
+            <a:schemeClr val="accent1"/>
+          </a:fillRef>
+          <a:effectRef idx="0">
+            <a:schemeClr val="accent1"/>
+          </a:effectRef>
+          <a:fontRef idx="minor">
+            <a:schemeClr val="tx1"/>
+          </a:fontRef>
+        </p:style>
+      </p:cxnSp>
+      <p:cxnSp>
+        <p:nvCxnSpPr>
+          <p:cNvPr id="22" name="Connecteur droit 21"/>
+          <p:cNvCxnSpPr/>
+          <p:nvPr/>
+        </p:nvCxnSpPr>
+        <p:spPr>
+          <a:xfrm>
+            <a:off x="5994573" y="4158183"/>
+            <a:ext cx="0" cy="288032"/>
+          </a:xfrm>
+          <a:prstGeom prst="line">
+            <a:avLst/>
+          </a:prstGeom>
+          <a:ln w="19050">
+            <a:solidFill>
+              <a:schemeClr val="tx1"/>
+            </a:solidFill>
+          </a:ln>
+        </p:spPr>
+        <p:style>
+          <a:lnRef idx="1">
+            <a:schemeClr val="accent1"/>
+          </a:lnRef>
+          <a:fillRef idx="0">
+            <a:schemeClr val="accent1"/>
+          </a:fillRef>
+          <a:effectRef idx="0">
+            <a:schemeClr val="accent1"/>
+          </a:effectRef>
+          <a:fontRef idx="minor">
+            <a:schemeClr val="tx1"/>
+          </a:fontRef>
+        </p:style>
+      </p:cxnSp>
+      <p:cxnSp>
+        <p:nvCxnSpPr>
+          <p:cNvPr id="23" name="Connecteur droit 22"/>
+          <p:cNvCxnSpPr/>
+          <p:nvPr/>
+        </p:nvCxnSpPr>
+        <p:spPr>
+          <a:xfrm>
+            <a:off x="7406050" y="4158183"/>
+            <a:ext cx="0" cy="288032"/>
+          </a:xfrm>
+          <a:prstGeom prst="line">
+            <a:avLst/>
+          </a:prstGeom>
+          <a:ln w="19050">
+            <a:solidFill>
+              <a:schemeClr val="tx1"/>
+            </a:solidFill>
+          </a:ln>
+        </p:spPr>
+        <p:style>
+          <a:lnRef idx="1">
+            <a:schemeClr val="accent1"/>
+          </a:lnRef>
+          <a:fillRef idx="0">
+            <a:schemeClr val="accent1"/>
+          </a:fillRef>
+          <a:effectRef idx="0">
+            <a:schemeClr val="accent1"/>
+          </a:effectRef>
+          <a:fontRef idx="minor">
+            <a:schemeClr val="tx1"/>
+          </a:fontRef>
+        </p:style>
+      </p:cxnSp>
+      <p:cxnSp>
+        <p:nvCxnSpPr>
+          <p:cNvPr id="24" name="Connecteur droit 23"/>
+          <p:cNvCxnSpPr/>
+          <p:nvPr/>
+        </p:nvCxnSpPr>
+        <p:spPr>
+          <a:xfrm>
+            <a:off x="5802312" y="4446215"/>
+            <a:ext cx="192261" cy="0"/>
+          </a:xfrm>
+          <a:prstGeom prst="line">
+            <a:avLst/>
+          </a:prstGeom>
+          <a:ln w="19050">
+            <a:solidFill>
+              <a:schemeClr val="tx1"/>
+            </a:solidFill>
+          </a:ln>
+        </p:spPr>
+        <p:style>
+          <a:lnRef idx="1">
+            <a:schemeClr val="accent1"/>
+          </a:lnRef>
+          <a:fillRef idx="0">
+            <a:schemeClr val="accent1"/>
+          </a:fillRef>
+          <a:effectRef idx="0">
+            <a:schemeClr val="accent1"/>
+          </a:effectRef>
+          <a:fontRef idx="minor">
+            <a:schemeClr val="tx1"/>
+          </a:fontRef>
+        </p:style>
+      </p:cxnSp>
+      <p:cxnSp>
+        <p:nvCxnSpPr>
+          <p:cNvPr id="25" name="Connecteur droit 24"/>
+          <p:cNvCxnSpPr/>
+          <p:nvPr/>
+        </p:nvCxnSpPr>
+        <p:spPr>
+          <a:xfrm>
+            <a:off x="7410251" y="4446215"/>
+            <a:ext cx="2064469" cy="0"/>
+          </a:xfrm>
+          <a:prstGeom prst="line">
+            <a:avLst/>
+          </a:prstGeom>
+          <a:ln w="19050">
+            <a:solidFill>
+              <a:schemeClr val="tx1"/>
+            </a:solidFill>
+          </a:ln>
+        </p:spPr>
+        <p:style>
+          <a:lnRef idx="1">
+            <a:schemeClr val="accent1"/>
+          </a:lnRef>
+          <a:fillRef idx="0">
+            <a:schemeClr val="accent1"/>
+          </a:fillRef>
+          <a:effectRef idx="0">
+            <a:schemeClr val="accent1"/>
+          </a:effectRef>
+          <a:fontRef idx="minor">
+            <a:schemeClr val="tx1"/>
+          </a:fontRef>
+        </p:style>
+      </p:cxnSp>
+      <p:cxnSp>
+        <p:nvCxnSpPr>
+          <p:cNvPr id="26" name="Connecteur droit 25"/>
+          <p:cNvCxnSpPr/>
+          <p:nvPr/>
+        </p:nvCxnSpPr>
+        <p:spPr>
+          <a:xfrm>
+            <a:off x="5994573" y="4158183"/>
+            <a:ext cx="1411477" cy="0"/>
+          </a:xfrm>
+          <a:prstGeom prst="line">
+            <a:avLst/>
+          </a:prstGeom>
+          <a:ln w="19050">
+            <a:solidFill>
+              <a:schemeClr val="tx1"/>
+            </a:solidFill>
+          </a:ln>
+        </p:spPr>
+        <p:style>
+          <a:lnRef idx="1">
+            <a:schemeClr val="accent1"/>
+          </a:lnRef>
+          <a:fillRef idx="0">
+            <a:schemeClr val="accent1"/>
+          </a:fillRef>
+          <a:effectRef idx="0">
+            <a:schemeClr val="accent1"/>
+          </a:effectRef>
+          <a:fontRef idx="minor">
+            <a:schemeClr val="tx1"/>
+          </a:fontRef>
+        </p:style>
+      </p:cxnSp>
+      <p:sp>
+        <p:nvSpPr>
+          <p:cNvPr id="17" name="ZoneTexte 16"/>
+          <p:cNvSpPr txBox="1"/>
+          <p:nvPr/>
+        </p:nvSpPr>
+        <p:spPr>
+          <a:xfrm>
+            <a:off x="1153827" y="4148891"/>
+            <a:ext cx="1369286" cy="369332"/>
+          </a:xfrm>
+          <a:prstGeom prst="rect">
+            <a:avLst/>
+          </a:prstGeom>
+          <a:noFill/>
+        </p:spPr>
+        <p:txBody>
+          <a:bodyPr wrap="none" rtlCol="0">
+            <a:spAutoFit/>
+          </a:bodyPr>
+          <a:lstStyle/>
+          <a:p>
+            <a:pPr algn="ctr"/>
+            <a:r>
+              <a:rPr lang="fr-FR" b="1" dirty="0" err="1" smtClean="0">
+                <a:latin typeface="Times New Roman" panose="02020603050405020304" pitchFamily="18" charset="0"/>
+                <a:cs typeface="Times New Roman" panose="02020603050405020304" pitchFamily="18" charset="0"/>
+              </a:rPr>
+              <a:t>Res</a:t>
+            </a:r>
+            <a:r>
+              <a:rPr lang="fr-FR" b="1" dirty="0" smtClean="0">
+                <a:latin typeface="Times New Roman" panose="02020603050405020304" pitchFamily="18" charset="0"/>
+                <a:cs typeface="Times New Roman" panose="02020603050405020304" pitchFamily="18" charset="0"/>
+              </a:rPr>
+              <a:t>. </a:t>
+            </a:r>
+            <a:r>
+              <a:rPr lang="fr-FR" b="1" dirty="0" smtClean="0">
+                <a:latin typeface="Symbol" panose="05050102010706020507" pitchFamily="18" charset="2"/>
+                <a:cs typeface="Times New Roman" panose="02020603050405020304" pitchFamily="18" charset="0"/>
+              </a:rPr>
+              <a:t>s</a:t>
+            </a:r>
+            <a:r>
+              <a:rPr lang="fr-FR" b="1" dirty="0" smtClean="0">
+                <a:latin typeface="Times New Roman" panose="02020603050405020304" pitchFamily="18" charset="0"/>
+                <a:cs typeface="Times New Roman" panose="02020603050405020304" pitchFamily="18" charset="0"/>
+              </a:rPr>
+              <a:t> pulse</a:t>
+            </a:r>
+            <a:endParaRPr lang="fr-FR" b="1" dirty="0">
+              <a:latin typeface="Times New Roman" panose="02020603050405020304" pitchFamily="18" charset="0"/>
+              <a:cs typeface="Times New Roman" panose="02020603050405020304" pitchFamily="18" charset="0"/>
+            </a:endParaRPr>
+          </a:p>
+        </p:txBody>
+      </p:sp>
+      <p:sp>
+        <p:nvSpPr>
+          <p:cNvPr id="28" name="ZoneTexte 27"/>
+          <p:cNvSpPr txBox="1"/>
+          <p:nvPr/>
+        </p:nvSpPr>
+        <p:spPr>
+          <a:xfrm>
+            <a:off x="6004661" y="4148891"/>
+            <a:ext cx="1358064" cy="369332"/>
+          </a:xfrm>
+          <a:prstGeom prst="rect">
+            <a:avLst/>
+          </a:prstGeom>
+          <a:noFill/>
+        </p:spPr>
+        <p:txBody>
+          <a:bodyPr wrap="none" rtlCol="0">
+            <a:spAutoFit/>
+          </a:bodyPr>
+          <a:lstStyle/>
+          <a:p>
+            <a:pPr algn="ctr"/>
+            <a:r>
+              <a:rPr lang="fr-FR" b="1" dirty="0" err="1" smtClean="0">
+                <a:latin typeface="Times New Roman" panose="02020603050405020304" pitchFamily="18" charset="0"/>
+                <a:cs typeface="Times New Roman" panose="02020603050405020304" pitchFamily="18" charset="0"/>
+              </a:rPr>
+              <a:t>Res</a:t>
+            </a:r>
+            <a:r>
+              <a:rPr lang="fr-FR" b="1" dirty="0" smtClean="0">
+                <a:latin typeface="Times New Roman" panose="02020603050405020304" pitchFamily="18" charset="0"/>
+                <a:cs typeface="Times New Roman" panose="02020603050405020304" pitchFamily="18" charset="0"/>
+              </a:rPr>
+              <a:t>. </a:t>
+            </a:r>
+            <a:r>
+              <a:rPr lang="fr-FR" b="1" dirty="0" smtClean="0">
+                <a:latin typeface="Symbol" panose="05050102010706020507" pitchFamily="18" charset="2"/>
+                <a:cs typeface="Times New Roman" panose="02020603050405020304" pitchFamily="18" charset="0"/>
+              </a:rPr>
+              <a:t>s</a:t>
+            </a:r>
+            <a:r>
+              <a:rPr lang="fr-FR" b="1" dirty="0" smtClean="0">
+                <a:latin typeface="Times New Roman" panose="02020603050405020304" pitchFamily="18" charset="0"/>
+                <a:cs typeface="Times New Roman" panose="02020603050405020304" pitchFamily="18" charset="0"/>
+              </a:rPr>
+              <a:t> pulse</a:t>
+            </a:r>
+            <a:endParaRPr lang="fr-FR" b="1" dirty="0">
+              <a:latin typeface="Times New Roman" panose="02020603050405020304" pitchFamily="18" charset="0"/>
+              <a:cs typeface="Times New Roman" panose="02020603050405020304" pitchFamily="18" charset="0"/>
+            </a:endParaRPr>
+          </a:p>
+        </p:txBody>
+      </p:sp>
     </p:spTree>
     <p:extLst>
       <p:ext uri="{BB962C8B-B14F-4D97-AF65-F5344CB8AC3E}">

</xml_diff>